<commit_message>
filtering attempt for a day
</commit_message>
<xml_diff>
--- a/Zwischenpraesentation_Noah.pptx
+++ b/Zwischenpraesentation_Noah.pptx
@@ -2879,33 +2879,6 @@
       </p:grpSpPr>
       <p:sp>
         <p:nvSpPr>
-          <p:cNvPr id="3" name="Inhaltsplatzhalter 2"/>
-          <p:cNvSpPr>
-            <a:spLocks noGrp="1"/>
-          </p:cNvSpPr>
-          <p:nvPr>
-            <p:ph idx="1"/>
-          </p:nvPr>
-        </p:nvSpPr>
-        <p:spPr>
-          <a:xfrm>
-            <a:off x="302605" y="1347759"/>
-            <a:ext cx="11554963" cy="1505177"/>
-          </a:xfrm>
-        </p:spPr>
-        <p:txBody>
-          <a:bodyPr/>
-          <a:lstStyle/>
-          <a:p>
-            <a:pPr marL="0" indent="0">
-              <a:buNone/>
-            </a:pPr>
-            <a:endParaRPr lang="de-DE" dirty="0"/>
-          </a:p>
-        </p:txBody>
-      </p:sp>
-      <p:sp>
-        <p:nvSpPr>
           <p:cNvPr id="4" name="Foliennummernplatzhalter 3"/>
           <p:cNvSpPr>
             <a:spLocks noGrp="1"/>
@@ -3128,6 +3101,210 @@
               </a:rPr>
               <a:t>Statistisches Praktikum</a:t>
             </a:r>
+          </a:p>
+        </p:txBody>
+      </p:sp>
+      <p:pic>
+        <p:nvPicPr>
+          <p:cNvPr id="6" name="Picture 5" descr="Chart, histogram&#10;&#10;Description automatically generated">
+            <a:extLst>
+              <a:ext uri="{FF2B5EF4-FFF2-40B4-BE49-F238E27FC236}">
+                <a16:creationId xmlns:a16="http://schemas.microsoft.com/office/drawing/2014/main" id="{AB821982-1730-4852-953E-D52B75166CDA}"/>
+              </a:ext>
+            </a:extLst>
+          </p:cNvPr>
+          <p:cNvPicPr>
+            <a:picLocks noChangeAspect="1"/>
+          </p:cNvPicPr>
+          <p:nvPr/>
+        </p:nvPicPr>
+        <p:blipFill>
+          <a:blip r:embed="rId2">
+            <a:extLst>
+              <a:ext uri="{28A0092B-C50C-407E-A947-70E740481C1C}">
+                <a14:useLocalDpi xmlns:a14="http://schemas.microsoft.com/office/drawing/2010/main" val="0"/>
+              </a:ext>
+            </a:extLst>
+          </a:blip>
+          <a:stretch>
+            <a:fillRect/>
+          </a:stretch>
+        </p:blipFill>
+        <p:spPr>
+          <a:xfrm>
+            <a:off x="4141566" y="1743681"/>
+            <a:ext cx="4104456" cy="3065569"/>
+          </a:xfrm>
+          <a:prstGeom prst="rect">
+            <a:avLst/>
+          </a:prstGeom>
+        </p:spPr>
+      </p:pic>
+      <p:pic>
+        <p:nvPicPr>
+          <p:cNvPr id="11" name="Picture 10" descr="Chart, histogram&#10;&#10;Description automatically generated">
+            <a:extLst>
+              <a:ext uri="{FF2B5EF4-FFF2-40B4-BE49-F238E27FC236}">
+                <a16:creationId xmlns:a16="http://schemas.microsoft.com/office/drawing/2014/main" id="{81D634C7-0B84-4C10-B8C0-7BEE4A86A663}"/>
+              </a:ext>
+            </a:extLst>
+          </p:cNvPr>
+          <p:cNvPicPr>
+            <a:picLocks noChangeAspect="1"/>
+          </p:cNvPicPr>
+          <p:nvPr/>
+        </p:nvPicPr>
+        <p:blipFill>
+          <a:blip r:embed="rId3">
+            <a:extLst>
+              <a:ext uri="{28A0092B-C50C-407E-A947-70E740481C1C}">
+                <a14:useLocalDpi xmlns:a14="http://schemas.microsoft.com/office/drawing/2010/main" val="0"/>
+              </a:ext>
+            </a:extLst>
+          </a:blip>
+          <a:stretch>
+            <a:fillRect/>
+          </a:stretch>
+        </p:blipFill>
+        <p:spPr>
+          <a:xfrm>
+            <a:off x="56245" y="1754590"/>
+            <a:ext cx="4104456" cy="3043753"/>
+          </a:xfrm>
+          <a:prstGeom prst="rect">
+            <a:avLst/>
+          </a:prstGeom>
+        </p:spPr>
+      </p:pic>
+      <p:pic>
+        <p:nvPicPr>
+          <p:cNvPr id="13" name="Picture 12" descr="Chart, bar chart, histogram&#10;&#10;Description automatically generated">
+            <a:extLst>
+              <a:ext uri="{FF2B5EF4-FFF2-40B4-BE49-F238E27FC236}">
+                <a16:creationId xmlns:a16="http://schemas.microsoft.com/office/drawing/2014/main" id="{EA31DA90-894E-415A-AEEC-01232CAF1912}"/>
+              </a:ext>
+            </a:extLst>
+          </p:cNvPr>
+          <p:cNvPicPr>
+            <a:picLocks noChangeAspect="1"/>
+          </p:cNvPicPr>
+          <p:nvPr/>
+        </p:nvPicPr>
+        <p:blipFill>
+          <a:blip r:embed="rId4">
+            <a:extLst>
+              <a:ext uri="{28A0092B-C50C-407E-A947-70E740481C1C}">
+                <a14:useLocalDpi xmlns:a14="http://schemas.microsoft.com/office/drawing/2010/main" val="0"/>
+              </a:ext>
+            </a:extLst>
+          </a:blip>
+          <a:stretch>
+            <a:fillRect/>
+          </a:stretch>
+        </p:blipFill>
+        <p:spPr>
+          <a:xfrm>
+            <a:off x="8031302" y="1741651"/>
+            <a:ext cx="4104456" cy="3065569"/>
+          </a:xfrm>
+          <a:prstGeom prst="rect">
+            <a:avLst/>
+          </a:prstGeom>
+        </p:spPr>
+      </p:pic>
+      <p:sp>
+        <p:nvSpPr>
+          <p:cNvPr id="14" name="TextBox 13">
+            <a:extLst>
+              <a:ext uri="{FF2B5EF4-FFF2-40B4-BE49-F238E27FC236}">
+                <a16:creationId xmlns:a16="http://schemas.microsoft.com/office/drawing/2014/main" id="{F86650F3-F89C-48C7-82F9-CFE8318B6EED}"/>
+              </a:ext>
+            </a:extLst>
+          </p:cNvPr>
+          <p:cNvSpPr txBox="1"/>
+          <p:nvPr/>
+        </p:nvSpPr>
+        <p:spPr>
+          <a:xfrm>
+            <a:off x="1919536" y="1340768"/>
+            <a:ext cx="2127762" cy="276999"/>
+          </a:xfrm>
+          <a:prstGeom prst="rect">
+            <a:avLst/>
+          </a:prstGeom>
+          <a:noFill/>
+        </p:spPr>
+        <p:txBody>
+          <a:bodyPr wrap="none" rtlCol="0">
+            <a:spAutoFit/>
+          </a:bodyPr>
+          <a:lstStyle/>
+          <a:p>
+            <a:r>
+              <a:rPr lang="en-US" dirty="0" err="1"/>
+              <a:t>Dbscan</a:t>
+            </a:r>
+            <a:r>
+              <a:rPr lang="en-US" dirty="0"/>
+              <a:t> </a:t>
+            </a:r>
+            <a:r>
+              <a:rPr lang="en-US" dirty="0" err="1"/>
+              <a:t>versuch</a:t>
+            </a:r>
+            <a:r>
+              <a:rPr lang="en-US" dirty="0"/>
+              <a:t> am 01.01.2006</a:t>
+            </a:r>
+            <a:endParaRPr lang="LID4096" dirty="0"/>
+          </a:p>
+        </p:txBody>
+      </p:sp>
+      <p:sp>
+        <p:nvSpPr>
+          <p:cNvPr id="15" name="TextBox 14">
+            <a:extLst>
+              <a:ext uri="{FF2B5EF4-FFF2-40B4-BE49-F238E27FC236}">
+                <a16:creationId xmlns:a16="http://schemas.microsoft.com/office/drawing/2014/main" id="{A72BE9FE-E1D6-4E40-BF42-B76DCE2B6764}"/>
+              </a:ext>
+            </a:extLst>
+          </p:cNvPr>
+          <p:cNvSpPr txBox="1"/>
+          <p:nvPr/>
+        </p:nvSpPr>
+        <p:spPr>
+          <a:xfrm>
+            <a:off x="2675620" y="5301208"/>
+            <a:ext cx="933076" cy="276999"/>
+          </a:xfrm>
+          <a:prstGeom prst="rect">
+            <a:avLst/>
+          </a:prstGeom>
+          <a:noFill/>
+        </p:spPr>
+        <p:txBody>
+          <a:bodyPr wrap="none" rtlCol="0">
+            <a:spAutoFit/>
+          </a:bodyPr>
+          <a:lstStyle/>
+          <a:p>
+            <a:r>
+              <a:rPr lang="en-US" dirty="0" err="1"/>
+              <a:t>Gwl</a:t>
+            </a:r>
+            <a:r>
+              <a:rPr lang="en-US" dirty="0"/>
+              <a:t> </a:t>
+            </a:r>
+            <a:r>
+              <a:rPr lang="en-US" dirty="0" err="1"/>
+              <a:t>ist</a:t>
+            </a:r>
+            <a:r>
+              <a:rPr lang="en-US" dirty="0"/>
+              <a:t> TRM</a:t>
+            </a:r>
+            <a:endParaRPr lang="LID4096" dirty="0"/>
           </a:p>
         </p:txBody>
       </p:sp>

</xml_diff>